<commit_message>
fixed some errors in the presentation
</commit_message>
<xml_diff>
--- a/doc/presentation.pptx
+++ b/doc/presentation.pptx
@@ -4927,11 +4927,7 @@
             </a:r>
             <a:r>
               <a:rPr lang="en-US" dirty="0" smtClean="0"/>
-              <a:t>English</a:t>
-            </a:r>
-            <a:r>
-              <a:rPr lang="en-US" dirty="0" smtClean="0"/>
-              <a:t>)</a:t>
+              <a:t>English)</a:t>
             </a:r>
             <a:endParaRPr lang="en-US" dirty="0"/>
           </a:p>
@@ -5574,7 +5570,11 @@
             </a:r>
             <a:r>
               <a:rPr lang="en-US" dirty="0"/>
-              <a:t>the dataset has over 40,000 entries and around 100 rows </a:t>
+              <a:t>the dataset has over 40,000 entries and around 100 </a:t>
+            </a:r>
+            <a:r>
+              <a:rPr lang="en-US" dirty="0" smtClean="0"/>
+              <a:t>columns </a:t>
             </a:r>
             <a:r>
               <a:rPr lang="en-DE" dirty="0"/>
@@ -6170,7 +6170,15 @@
             </a:r>
             <a:r>
               <a:rPr lang="en-US" dirty="0"/>
-              <a:t>potentially problematic chars (for example spaces</a:t>
+              <a:t>potentially problematic </a:t>
+            </a:r>
+            <a:r>
+              <a:rPr lang="en-US" dirty="0" smtClean="0"/>
+              <a:t>characters </a:t>
+            </a:r>
+            <a:r>
+              <a:rPr lang="en-US" dirty="0"/>
+              <a:t>(for example spaces</a:t>
             </a:r>
             <a:r>
               <a:rPr lang="en-US" dirty="0" smtClean="0"/>
@@ -6507,39 +6515,7 @@
                   <a:schemeClr val="tx1"/>
                 </a:solidFill>
               </a:rPr>
-              <a:t>Features </a:t>
-            </a:r>
-            <a:r>
-              <a:rPr lang="en-US" sz="1600" dirty="0" smtClean="0">
-                <a:solidFill>
-                  <a:schemeClr val="tx1"/>
-                </a:solidFill>
-              </a:rPr>
-              <a:t>most related (positively or negatively) to the sales variable </a:t>
-            </a:r>
-            <a:r>
-              <a:rPr lang="en-US" sz="1600" dirty="0" smtClean="0">
-                <a:solidFill>
-                  <a:schemeClr val="tx1"/>
-                </a:solidFill>
-              </a:rPr>
-              <a:t>should be </a:t>
-            </a:r>
-            <a:r>
-              <a:rPr lang="en-US" sz="1600" dirty="0" smtClean="0">
-                <a:solidFill>
-                  <a:schemeClr val="tx1"/>
-                </a:solidFill>
-              </a:rPr>
-              <a:t>selected for building the </a:t>
-            </a:r>
-            <a:r>
-              <a:rPr lang="en-US" sz="1600" dirty="0" smtClean="0">
-                <a:solidFill>
-                  <a:schemeClr val="tx1"/>
-                </a:solidFill>
-              </a:rPr>
-              <a:t>models</a:t>
+              <a:t>Features most related (positively or negatively) to the sales variable should be selected for building the models</a:t>
             </a:r>
           </a:p>
           <a:p>
@@ -6558,7 +6534,23 @@
                   <a:schemeClr val="tx1"/>
                 </a:solidFill>
               </a:rPr>
-              <a:t>Multiple options of maximum numbers of features were tested</a:t>
+              <a:t>Multiple options of maximum </a:t>
+            </a:r>
+            <a:r>
+              <a:rPr lang="en-US" sz="1600" dirty="0" smtClean="0">
+                <a:solidFill>
+                  <a:schemeClr val="tx1"/>
+                </a:solidFill>
+              </a:rPr>
+              <a:t>number </a:t>
+            </a:r>
+            <a:r>
+              <a:rPr lang="en-US" sz="1600" dirty="0" smtClean="0">
+                <a:solidFill>
+                  <a:schemeClr val="tx1"/>
+                </a:solidFill>
+              </a:rPr>
+              <a:t>of features were tested</a:t>
             </a:r>
           </a:p>
           <a:p>
@@ -6602,28 +6594,8 @@
               <a:t>Final </a:t>
             </a:r>
             <a:r>
-              <a:rPr lang="en-US" dirty="0"/>
-              <a:t>Dataset </a:t>
-            </a:r>
-            <a:r>
               <a:rPr lang="en-US" dirty="0" smtClean="0"/>
-              <a:t>structure (with </a:t>
-            </a:r>
-            <a:r>
-              <a:rPr lang="en-US" dirty="0" err="1" smtClean="0"/>
-              <a:t>upsampling</a:t>
-            </a:r>
-            <a:r>
-              <a:rPr lang="en-US" dirty="0" smtClean="0"/>
-              <a:t>): 78734 </a:t>
-            </a:r>
-            <a:r>
-              <a:rPr lang="en-US" dirty="0"/>
-              <a:t>rows x 628 </a:t>
-            </a:r>
-            <a:r>
-              <a:rPr lang="en-US" dirty="0" smtClean="0"/>
-              <a:t>columns </a:t>
+              <a:t>Dataset: 628 features </a:t>
             </a:r>
             <a:endParaRPr lang="en-US" dirty="0" smtClean="0">
               <a:solidFill>
@@ -6940,19 +6912,11 @@
             </a:pPr>
             <a:r>
               <a:rPr lang="de-DE" b="1" dirty="0" smtClean="0"/>
-              <a:t>Solution</a:t>
-            </a:r>
-            <a:r>
-              <a:rPr lang="de-DE" b="1" smtClean="0"/>
-              <a:t>:</a:t>
-            </a:r>
-            <a:r>
-              <a:rPr lang="de-DE" smtClean="0"/>
-              <a:t> Use of upsampling </a:t>
+              <a:t>Solution:</a:t>
             </a:r>
             <a:r>
               <a:rPr lang="de-DE" dirty="0" smtClean="0"/>
-              <a:t>to balance the data</a:t>
+              <a:t> Use of upsampling to balance the data</a:t>
             </a:r>
             <a:endParaRPr lang="en-US" b="1" dirty="0" smtClean="0"/>
           </a:p>
@@ -7243,7 +7207,15 @@
             </a:pPr>
             <a:r>
               <a:rPr lang="en-US" dirty="0" smtClean="0"/>
-              <a:t>Models tried: Gradient Boosting Classifier, Logistic Regression, Gaussian Naive Bayes, Perceptron, </a:t>
+              <a:t>Models tried: Gradient Boosting Classifier, Logistic Regression, Gaussian Naive Bayes, </a:t>
+            </a:r>
+            <a:r>
+              <a:rPr lang="en-US" dirty="0" smtClean="0"/>
+              <a:t>Multilayer-Perceptron</a:t>
+            </a:r>
+            <a:r>
+              <a:rPr lang="en-US" dirty="0" smtClean="0"/>
+              <a:t>, </a:t>
             </a:r>
             <a:r>
               <a:rPr lang="en-US" dirty="0"/>
@@ -7270,11 +7242,7 @@
             </a:r>
             <a:r>
               <a:rPr lang="en-US" dirty="0" smtClean="0"/>
-              <a:t>Random Forest with </a:t>
-            </a:r>
-            <a:r>
-              <a:rPr lang="en-US" dirty="0" smtClean="0"/>
-              <a:t>98% accuracy</a:t>
+              <a:t>Random Forest with 98% accuracy</a:t>
             </a:r>
           </a:p>
         </p:txBody>
@@ -8277,7 +8245,7 @@
                   <a:schemeClr val="tx1"/>
                 </a:solidFill>
               </a:rPr>
-              <a:t>hyperparaeters</a:t>
+              <a:t>hyperparameters</a:t>
             </a:r>
             <a:endParaRPr lang="en-US" sz="1600" dirty="0" smtClean="0">
               <a:solidFill>
@@ -8299,12 +8267,12 @@
               <a:defRPr/>
             </a:pPr>
             <a:r>
-              <a:rPr lang="en-US" sz="1600" dirty="0" err="1" smtClean="0">
+              <a:rPr lang="en-US" sz="1600" dirty="0">
                 <a:solidFill>
                   <a:schemeClr val="tx1"/>
                 </a:solidFill>
               </a:rPr>
-              <a:t>Minmizes</a:t>
+              <a:t>Optimizes search by using previous </a:t>
             </a:r>
             <a:r>
               <a:rPr lang="en-US" sz="1600" dirty="0" smtClean="0">
@@ -8312,8 +8280,13 @@
                   <a:schemeClr val="tx1"/>
                 </a:solidFill>
               </a:rPr>
-              <a:t> number of necessary evaluations</a:t>
-            </a:r>
+              <a:t>iterations</a:t>
+            </a:r>
+            <a:endParaRPr lang="en-US" sz="1600" dirty="0" smtClean="0">
+              <a:solidFill>
+                <a:schemeClr val="tx1"/>
+              </a:solidFill>
+            </a:endParaRPr>
           </a:p>
           <a:p>
             <a:pPr marL="900113" lvl="2" indent="-214313" algn="l">
@@ -8329,13 +8302,34 @@
               <a:defRPr/>
             </a:pPr>
             <a:r>
+              <a:rPr lang="en-US" sz="1600" dirty="0" err="1" smtClean="0">
+                <a:solidFill>
+                  <a:schemeClr val="tx1"/>
+                </a:solidFill>
+              </a:rPr>
+              <a:t>Minmizes</a:t>
+            </a:r>
+            <a:r>
               <a:rPr lang="en-US" sz="1600" dirty="0" smtClean="0">
                 <a:solidFill>
                   <a:schemeClr val="tx1"/>
                 </a:solidFill>
               </a:rPr>
-              <a:t>Optimizes search by using previous iterations</a:t>
-            </a:r>
+              <a:t> number of necessary </a:t>
+            </a:r>
+            <a:r>
+              <a:rPr lang="en-US" sz="1600" dirty="0" smtClean="0">
+                <a:solidFill>
+                  <a:schemeClr val="tx1"/>
+                </a:solidFill>
+              </a:rPr>
+              <a:t>evaluations</a:t>
+            </a:r>
+            <a:endParaRPr lang="en-US" sz="1600" dirty="0" smtClean="0">
+              <a:solidFill>
+                <a:schemeClr val="tx1"/>
+              </a:solidFill>
+            </a:endParaRPr>
           </a:p>
         </p:txBody>
       </p:sp>

</xml_diff>

<commit_message>
fixed upsampling happening before test/train split
</commit_message>
<xml_diff>
--- a/doc/presentation.pptx
+++ b/doc/presentation.pptx
@@ -266,7 +266,7 @@
           <a:p>
             <a:fld id="{0C1536B9-5F5C-4A2C-AF12-C3FD1E8FC9A0}" type="datetimeFigureOut">
               <a:rPr lang="de-DE" smtClean="0"/>
-              <a:t>12.02.2024</a:t>
+              <a:t>13.02.2024</a:t>
             </a:fld>
             <a:endParaRPr lang="de-DE"/>
           </a:p>
@@ -6534,23 +6534,7 @@
                   <a:schemeClr val="tx1"/>
                 </a:solidFill>
               </a:rPr>
-              <a:t>Multiple options of maximum </a:t>
-            </a:r>
-            <a:r>
-              <a:rPr lang="en-US" sz="1600" dirty="0" smtClean="0">
-                <a:solidFill>
-                  <a:schemeClr val="tx1"/>
-                </a:solidFill>
-              </a:rPr>
-              <a:t>number </a:t>
-            </a:r>
-            <a:r>
-              <a:rPr lang="en-US" sz="1600" dirty="0" smtClean="0">
-                <a:solidFill>
-                  <a:schemeClr val="tx1"/>
-                </a:solidFill>
-              </a:rPr>
-              <a:t>of features were tested</a:t>
+              <a:t>Multiple options of maximum number of features were tested</a:t>
             </a:r>
           </a:p>
           <a:p>
@@ -7207,19 +7191,19 @@
             </a:pPr>
             <a:r>
               <a:rPr lang="en-US" dirty="0" smtClean="0"/>
-              <a:t>Models tried: Gradient Boosting Classifier, Logistic Regression, Gaussian Naive Bayes, </a:t>
+              <a:t>Models </a:t>
             </a:r>
             <a:r>
               <a:rPr lang="en-US" dirty="0" smtClean="0"/>
-              <a:t>Multilayer-Perceptron</a:t>
+              <a:t>tried: Logistic </a:t>
             </a:r>
             <a:r>
               <a:rPr lang="en-US" dirty="0" smtClean="0"/>
-              <a:t>, </a:t>
+              <a:t>Regression, Gaussian Naive Bayes, Multilayer-Perceptron, </a:t>
             </a:r>
             <a:r>
               <a:rPr lang="en-US" dirty="0"/>
-              <a:t>Random Forest</a:t>
+              <a:t>Random Forest, Gradient Boosting Classifier</a:t>
             </a:r>
             <a:endParaRPr lang="en-US" dirty="0" smtClean="0"/>
           </a:p>
@@ -7242,7 +7226,15 @@
             </a:r>
             <a:r>
               <a:rPr lang="en-US" dirty="0" smtClean="0"/>
-              <a:t>Random Forest with 98% accuracy</a:t>
+              <a:t>Random Forest with </a:t>
+            </a:r>
+            <a:r>
+              <a:rPr lang="en-US" dirty="0" smtClean="0"/>
+              <a:t>84% </a:t>
+            </a:r>
+            <a:r>
+              <a:rPr lang="en-US" dirty="0" smtClean="0"/>
+              <a:t>accuracy</a:t>
             </a:r>
           </a:p>
         </p:txBody>
@@ -8282,11 +8274,6 @@
               </a:rPr>
               <a:t>iterations</a:t>
             </a:r>
-            <a:endParaRPr lang="en-US" sz="1600" dirty="0" smtClean="0">
-              <a:solidFill>
-                <a:schemeClr val="tx1"/>
-              </a:solidFill>
-            </a:endParaRPr>
           </a:p>
           <a:p>
             <a:pPr marL="900113" lvl="2" indent="-214313" algn="l">
@@ -8315,21 +8302,8 @@
                   <a:schemeClr val="tx1"/>
                 </a:solidFill>
               </a:rPr>
-              <a:t> number of necessary </a:t>
-            </a:r>
-            <a:r>
-              <a:rPr lang="en-US" sz="1600" dirty="0" smtClean="0">
-                <a:solidFill>
-                  <a:schemeClr val="tx1"/>
-                </a:solidFill>
-              </a:rPr>
-              <a:t>evaluations</a:t>
-            </a:r>
-            <a:endParaRPr lang="en-US" sz="1600" dirty="0" smtClean="0">
-              <a:solidFill>
-                <a:schemeClr val="tx1"/>
-              </a:solidFill>
-            </a:endParaRPr>
+              <a:t> number of necessary evaluations</a:t>
+            </a:r>
           </a:p>
         </p:txBody>
       </p:sp>

</xml_diff>

<commit_message>
fixed best model name
</commit_message>
<xml_diff>
--- a/doc/presentation.pptx
+++ b/doc/presentation.pptx
@@ -7031,7 +7031,15 @@
             </a:r>
             <a:r>
               <a:rPr lang="en-US" dirty="0"/>
-              <a:t>Random Forest with 84% accuracy</a:t>
+              <a:t>Gradient </a:t>
+            </a:r>
+            <a:r>
+              <a:rPr lang="en-US"/>
+              <a:t>Boosting Classifier </a:t>
+            </a:r>
+            <a:r>
+              <a:rPr lang="en-US" dirty="0"/>
+              <a:t>with 84% accuracy</a:t>
             </a:r>
           </a:p>
         </p:txBody>

</xml_diff>